<commit_message>
updated presentation added proposal doc
</commit_message>
<xml_diff>
--- a/presentation/presentation_v1.pptx
+++ b/presentation/presentation_v1.pptx
@@ -5,7 +5,7 @@
     <p:sldMasterId id="2147483660" r:id="rId1"/>
   </p:sldMasterIdLst>
   <p:notesMasterIdLst>
-    <p:notesMasterId r:id="rId22"/>
+    <p:notesMasterId r:id="rId23"/>
   </p:notesMasterIdLst>
   <p:sldIdLst>
     <p:sldId id="256" r:id="rId2"/>
@@ -21,13 +21,14 @@
     <p:sldId id="270" r:id="rId12"/>
     <p:sldId id="266" r:id="rId13"/>
     <p:sldId id="265" r:id="rId14"/>
-    <p:sldId id="277" r:id="rId15"/>
-    <p:sldId id="272" r:id="rId16"/>
-    <p:sldId id="273" r:id="rId17"/>
-    <p:sldId id="275" r:id="rId18"/>
-    <p:sldId id="274" r:id="rId19"/>
-    <p:sldId id="268" r:id="rId20"/>
-    <p:sldId id="276" r:id="rId21"/>
+    <p:sldId id="280" r:id="rId15"/>
+    <p:sldId id="277" r:id="rId16"/>
+    <p:sldId id="272" r:id="rId17"/>
+    <p:sldId id="273" r:id="rId18"/>
+    <p:sldId id="275" r:id="rId19"/>
+    <p:sldId id="274" r:id="rId20"/>
+    <p:sldId id="268" r:id="rId21"/>
+    <p:sldId id="276" r:id="rId22"/>
   </p:sldIdLst>
   <p:sldSz cx="12192000" cy="6858000"/>
   <p:notesSz cx="6858000" cy="9144000"/>
@@ -134,6 +135,66 @@
 </p:presentation>
 </file>
 
+<file path=ppt/changesInfos/changesInfo1.xml><?xml version="1.0" encoding="utf-8"?>
+<pc:chgInfo xmlns:a="http://schemas.openxmlformats.org/drawingml/2006/main" xmlns:r="http://schemas.openxmlformats.org/officeDocument/2006/relationships" xmlns:ac="http://schemas.microsoft.com/office/drawing/2013/main/command" xmlns:pc="http://schemas.microsoft.com/office/powerpoint/2013/main/command">
+  <pc:docChgLst>
+    <pc:chgData name="lowell vaughen" userId="ad859198120fad78" providerId="LiveId" clId="{51955AF7-B46E-4C60-8A26-2655EA0FE297}"/>
+    <pc:docChg chg="custSel addSld modSld">
+      <pc:chgData name="lowell vaughen" userId="ad859198120fad78" providerId="LiveId" clId="{51955AF7-B46E-4C60-8A26-2655EA0FE297}" dt="2021-01-09T12:17:29.295" v="19" actId="20577"/>
+      <pc:docMkLst>
+        <pc:docMk/>
+      </pc:docMkLst>
+      <pc:sldChg chg="modSp mod">
+        <pc:chgData name="lowell vaughen" userId="ad859198120fad78" providerId="LiveId" clId="{51955AF7-B46E-4C60-8A26-2655EA0FE297}" dt="2021-01-09T12:17:29.295" v="19" actId="20577"/>
+        <pc:sldMkLst>
+          <pc:docMk/>
+          <pc:sldMk cId="362354245" sldId="259"/>
+        </pc:sldMkLst>
+        <pc:spChg chg="mod">
+          <ac:chgData name="lowell vaughen" userId="ad859198120fad78" providerId="LiveId" clId="{51955AF7-B46E-4C60-8A26-2655EA0FE297}" dt="2021-01-09T12:17:29.295" v="19" actId="20577"/>
+          <ac:spMkLst>
+            <pc:docMk/>
+            <pc:sldMk cId="362354245" sldId="259"/>
+            <ac:spMk id="2" creationId="{05D7848C-7435-4209-A5E2-A6FE1E0579D5}"/>
+          </ac:spMkLst>
+        </pc:spChg>
+      </pc:sldChg>
+      <pc:sldChg chg="addSp delSp modSp add mod modClrScheme chgLayout">
+        <pc:chgData name="lowell vaughen" userId="ad859198120fad78" providerId="LiveId" clId="{51955AF7-B46E-4C60-8A26-2655EA0FE297}" dt="2021-01-08T23:53:11.470" v="16" actId="122"/>
+        <pc:sldMkLst>
+          <pc:docMk/>
+          <pc:sldMk cId="3421903007" sldId="280"/>
+        </pc:sldMkLst>
+        <pc:spChg chg="mod ord">
+          <ac:chgData name="lowell vaughen" userId="ad859198120fad78" providerId="LiveId" clId="{51955AF7-B46E-4C60-8A26-2655EA0FE297}" dt="2021-01-08T23:53:11.470" v="16" actId="122"/>
+          <ac:spMkLst>
+            <pc:docMk/>
+            <pc:sldMk cId="3421903007" sldId="280"/>
+            <ac:spMk id="2" creationId="{05D7848C-7435-4209-A5E2-A6FE1E0579D5}"/>
+          </ac:spMkLst>
+        </pc:spChg>
+        <pc:spChg chg="add del mod">
+          <ac:chgData name="lowell vaughen" userId="ad859198120fad78" providerId="LiveId" clId="{51955AF7-B46E-4C60-8A26-2655EA0FE297}" dt="2021-01-08T23:52:59.397" v="5" actId="478"/>
+          <ac:spMkLst>
+            <pc:docMk/>
+            <pc:sldMk cId="3421903007" sldId="280"/>
+            <ac:spMk id="4" creationId="{644B4F0B-CF1D-4647-B919-3F91EEEBCE60}"/>
+          </ac:spMkLst>
+        </pc:spChg>
+        <pc:spChg chg="del mod ord">
+          <ac:chgData name="lowell vaughen" userId="ad859198120fad78" providerId="LiveId" clId="{51955AF7-B46E-4C60-8A26-2655EA0FE297}" dt="2021-01-08T23:52:56.867" v="4" actId="478"/>
+          <ac:spMkLst>
+            <pc:docMk/>
+            <pc:sldMk cId="3421903007" sldId="280"/>
+            <ac:spMk id="6" creationId="{B229212E-BBE8-4432-8449-727DE2783E64}"/>
+          </ac:spMkLst>
+        </pc:spChg>
+      </pc:sldChg>
+    </pc:docChg>
+  </pc:docChgLst>
+</pc:chgInfo>
+</file>
+
 <file path=ppt/notesMasters/notesMaster1.xml><?xml version="1.0" encoding="utf-8"?>
 <p:notesMaster xmlns:a="http://schemas.openxmlformats.org/drawingml/2006/main" xmlns:r="http://schemas.openxmlformats.org/officeDocument/2006/relationships" xmlns:p="http://schemas.openxmlformats.org/presentationml/2006/main">
   <p:cSld>
@@ -216,7 +277,7 @@
           <a:p>
             <a:fld id="{A1C19543-A7FC-4FD0-9A5D-3EFF4175D823}" type="datetimeFigureOut">
               <a:rPr lang="en-US" smtClean="0"/>
-              <a:t>1/7/2021</a:t>
+              <a:t>1/9/2021</a:t>
             </a:fld>
             <a:endParaRPr lang="en-US"/>
           </a:p>
@@ -1289,7 +1350,7 @@
           <a:p>
             <a:fld id="{73D52F63-1DD2-4FD3-B6FC-466444F6A960}" type="datetimeFigureOut">
               <a:rPr lang="en-US" smtClean="0"/>
-              <a:t>1/7/2021</a:t>
+              <a:t>1/9/2021</a:t>
             </a:fld>
             <a:endParaRPr lang="en-US"/>
           </a:p>
@@ -1540,7 +1601,7 @@
           <a:p>
             <a:fld id="{73D52F63-1DD2-4FD3-B6FC-466444F6A960}" type="datetimeFigureOut">
               <a:rPr lang="en-US" smtClean="0"/>
-              <a:t>1/7/2021</a:t>
+              <a:t>1/9/2021</a:t>
             </a:fld>
             <a:endParaRPr lang="en-US"/>
           </a:p>
@@ -1854,7 +1915,7 @@
           <a:p>
             <a:fld id="{73D52F63-1DD2-4FD3-B6FC-466444F6A960}" type="datetimeFigureOut">
               <a:rPr lang="en-US" smtClean="0"/>
-              <a:t>1/7/2021</a:t>
+              <a:t>1/9/2021</a:t>
             </a:fld>
             <a:endParaRPr lang="en-US"/>
           </a:p>
@@ -2195,7 +2256,7 @@
           <a:p>
             <a:fld id="{73D52F63-1DD2-4FD3-B6FC-466444F6A960}" type="datetimeFigureOut">
               <a:rPr lang="en-US" smtClean="0"/>
-              <a:t>1/7/2021</a:t>
+              <a:t>1/9/2021</a:t>
             </a:fld>
             <a:endParaRPr lang="en-US"/>
           </a:p>
@@ -2509,7 +2570,7 @@
           <a:p>
             <a:fld id="{73D52F63-1DD2-4FD3-B6FC-466444F6A960}" type="datetimeFigureOut">
               <a:rPr lang="en-US" smtClean="0"/>
-              <a:t>1/7/2021</a:t>
+              <a:t>1/9/2021</a:t>
             </a:fld>
             <a:endParaRPr lang="en-US"/>
           </a:p>
@@ -2902,7 +2963,7 @@
           <a:p>
             <a:fld id="{73D52F63-1DD2-4FD3-B6FC-466444F6A960}" type="datetimeFigureOut">
               <a:rPr lang="en-US" smtClean="0"/>
-              <a:t>1/7/2021</a:t>
+              <a:t>1/9/2021</a:t>
             </a:fld>
             <a:endParaRPr lang="en-US"/>
           </a:p>
@@ -3072,7 +3133,7 @@
           <a:p>
             <a:fld id="{73D52F63-1DD2-4FD3-B6FC-466444F6A960}" type="datetimeFigureOut">
               <a:rPr lang="en-US" smtClean="0"/>
-              <a:t>1/7/2021</a:t>
+              <a:t>1/9/2021</a:t>
             </a:fld>
             <a:endParaRPr lang="en-US"/>
           </a:p>
@@ -3252,7 +3313,7 @@
           <a:p>
             <a:fld id="{73D52F63-1DD2-4FD3-B6FC-466444F6A960}" type="datetimeFigureOut">
               <a:rPr lang="en-US" smtClean="0"/>
-              <a:t>1/7/2021</a:t>
+              <a:t>1/9/2021</a:t>
             </a:fld>
             <a:endParaRPr lang="en-US"/>
           </a:p>
@@ -3435,7 +3496,7 @@
           <a:p>
             <a:fld id="{73D52F63-1DD2-4FD3-B6FC-466444F6A960}" type="datetimeFigureOut">
               <a:rPr lang="en-US" smtClean="0"/>
-              <a:t>1/7/2021</a:t>
+              <a:t>1/9/2021</a:t>
             </a:fld>
             <a:endParaRPr lang="en-US"/>
           </a:p>
@@ -3682,7 +3743,7 @@
           <a:p>
             <a:fld id="{73D52F63-1DD2-4FD3-B6FC-466444F6A960}" type="datetimeFigureOut">
               <a:rPr lang="en-US" smtClean="0"/>
-              <a:t>1/7/2021</a:t>
+              <a:t>1/9/2021</a:t>
             </a:fld>
             <a:endParaRPr lang="en-US"/>
           </a:p>
@@ -3914,7 +3975,7 @@
           <a:p>
             <a:fld id="{73D52F63-1DD2-4FD3-B6FC-466444F6A960}" type="datetimeFigureOut">
               <a:rPr lang="en-US" smtClean="0"/>
-              <a:t>1/7/2021</a:t>
+              <a:t>1/9/2021</a:t>
             </a:fld>
             <a:endParaRPr lang="en-US"/>
           </a:p>
@@ -4288,7 +4349,7 @@
           <a:p>
             <a:fld id="{73D52F63-1DD2-4FD3-B6FC-466444F6A960}" type="datetimeFigureOut">
               <a:rPr lang="en-US" smtClean="0"/>
-              <a:t>1/7/2021</a:t>
+              <a:t>1/9/2021</a:t>
             </a:fld>
             <a:endParaRPr lang="en-US"/>
           </a:p>
@@ -4411,7 +4472,7 @@
           <a:p>
             <a:fld id="{73D52F63-1DD2-4FD3-B6FC-466444F6A960}" type="datetimeFigureOut">
               <a:rPr lang="en-US" smtClean="0"/>
-              <a:t>1/7/2021</a:t>
+              <a:t>1/9/2021</a:t>
             </a:fld>
             <a:endParaRPr lang="en-US"/>
           </a:p>
@@ -4506,7 +4567,7 @@
           <a:p>
             <a:fld id="{73D52F63-1DD2-4FD3-B6FC-466444F6A960}" type="datetimeFigureOut">
               <a:rPr lang="en-US" smtClean="0"/>
-              <a:t>1/7/2021</a:t>
+              <a:t>1/9/2021</a:t>
             </a:fld>
             <a:endParaRPr lang="en-US"/>
           </a:p>
@@ -4761,7 +4822,7 @@
           <a:p>
             <a:fld id="{73D52F63-1DD2-4FD3-B6FC-466444F6A960}" type="datetimeFigureOut">
               <a:rPr lang="en-US" smtClean="0"/>
-              <a:t>1/7/2021</a:t>
+              <a:t>1/9/2021</a:t>
             </a:fld>
             <a:endParaRPr lang="en-US"/>
           </a:p>
@@ -5024,7 +5085,7 @@
           <a:p>
             <a:fld id="{73D52F63-1DD2-4FD3-B6FC-466444F6A960}" type="datetimeFigureOut">
               <a:rPr lang="en-US" smtClean="0"/>
-              <a:t>1/7/2021</a:t>
+              <a:t>1/9/2021</a:t>
             </a:fld>
             <a:endParaRPr lang="en-US"/>
           </a:p>
@@ -5767,7 +5828,7 @@
           <a:p>
             <a:fld id="{73D52F63-1DD2-4FD3-B6FC-466444F6A960}" type="datetimeFigureOut">
               <a:rPr lang="en-US" smtClean="0"/>
-              <a:t>1/7/2021</a:t>
+              <a:t>1/9/2021</a:t>
             </a:fld>
             <a:endParaRPr lang="en-US"/>
           </a:p>
@@ -7009,6 +7070,65 @@
           <p:cNvPr id="2" name="Title 1">
             <a:extLst>
               <a:ext uri="{FF2B5EF4-FFF2-40B4-BE49-F238E27FC236}">
+                <a16:creationId xmlns:a16="http://schemas.microsoft.com/office/drawing/2014/main" id="{05D7848C-7435-4209-A5E2-A6FE1E0579D5}"/>
+              </a:ext>
+            </a:extLst>
+          </p:cNvPr>
+          <p:cNvSpPr>
+            <a:spLocks noGrp="1"/>
+          </p:cNvSpPr>
+          <p:nvPr>
+            <p:ph type="ctrTitle"/>
+          </p:nvPr>
+        </p:nvSpPr>
+        <p:spPr/>
+        <p:txBody>
+          <a:bodyPr/>
+          <a:lstStyle/>
+          <a:p>
+            <a:pPr algn="ctr"/>
+            <a:r>
+              <a:rPr lang="en-US" dirty="0"/>
+              <a:t>Questions</a:t>
+            </a:r>
+          </a:p>
+        </p:txBody>
+      </p:sp>
+    </p:spTree>
+    <p:extLst>
+      <p:ext uri="{BB962C8B-B14F-4D97-AF65-F5344CB8AC3E}">
+        <p14:creationId xmlns:p14="http://schemas.microsoft.com/office/powerpoint/2010/main" val="3421903007"/>
+      </p:ext>
+    </p:extLst>
+  </p:cSld>
+  <p:clrMapOvr>
+    <a:masterClrMapping/>
+  </p:clrMapOvr>
+</p:sld>
+</file>
+
+<file path=ppt/slides/slide15.xml><?xml version="1.0" encoding="utf-8"?>
+<p:sld xmlns:a="http://schemas.openxmlformats.org/drawingml/2006/main" xmlns:r="http://schemas.openxmlformats.org/officeDocument/2006/relationships" xmlns:p="http://schemas.openxmlformats.org/presentationml/2006/main">
+  <p:cSld>
+    <p:spTree>
+      <p:nvGrpSpPr>
+        <p:cNvPr id="1" name=""/>
+        <p:cNvGrpSpPr/>
+        <p:nvPr/>
+      </p:nvGrpSpPr>
+      <p:grpSpPr>
+        <a:xfrm>
+          <a:off x="0" y="0"/>
+          <a:ext cx="0" cy="0"/>
+          <a:chOff x="0" y="0"/>
+          <a:chExt cx="0" cy="0"/>
+        </a:xfrm>
+      </p:grpSpPr>
+      <p:sp>
+        <p:nvSpPr>
+          <p:cNvPr id="2" name="Title 1">
+            <a:extLst>
+              <a:ext uri="{FF2B5EF4-FFF2-40B4-BE49-F238E27FC236}">
                 <a16:creationId xmlns:a16="http://schemas.microsoft.com/office/drawing/2014/main" id="{E02259EC-1F0B-4F08-86E3-E7FC44190A0E}"/>
               </a:ext>
             </a:extLst>
@@ -7045,7 +7165,7 @@
 </p:sld>
 </file>
 
-<file path=ppt/slides/slide15.xml><?xml version="1.0" encoding="utf-8"?>
+<file path=ppt/slides/slide16.xml><?xml version="1.0" encoding="utf-8"?>
 <p:sld xmlns:a="http://schemas.openxmlformats.org/drawingml/2006/main" xmlns:r="http://schemas.openxmlformats.org/officeDocument/2006/relationships" xmlns:p="http://schemas.openxmlformats.org/presentationml/2006/main">
   <p:cSld>
     <p:spTree>
@@ -7378,7 +7498,7 @@
 </p:sld>
 </file>
 
-<file path=ppt/slides/slide16.xml><?xml version="1.0" encoding="utf-8"?>
+<file path=ppt/slides/slide17.xml><?xml version="1.0" encoding="utf-8"?>
 <p:sld xmlns:a="http://schemas.openxmlformats.org/drawingml/2006/main" xmlns:r="http://schemas.openxmlformats.org/officeDocument/2006/relationships" xmlns:p="http://schemas.openxmlformats.org/presentationml/2006/main">
   <p:cSld>
     <p:spTree>
@@ -7540,7 +7660,7 @@
 </p:sld>
 </file>
 
-<file path=ppt/slides/slide17.xml><?xml version="1.0" encoding="utf-8"?>
+<file path=ppt/slides/slide18.xml><?xml version="1.0" encoding="utf-8"?>
 <p:sld xmlns:a="http://schemas.openxmlformats.org/drawingml/2006/main" xmlns:r="http://schemas.openxmlformats.org/officeDocument/2006/relationships" xmlns:p="http://schemas.openxmlformats.org/presentationml/2006/main">
   <p:cSld>
     <p:spTree>
@@ -7714,7 +7834,7 @@
 </p:sld>
 </file>
 
-<file path=ppt/slides/slide18.xml><?xml version="1.0" encoding="utf-8"?>
+<file path=ppt/slides/slide19.xml><?xml version="1.0" encoding="utf-8"?>
 <p:sld xmlns:a="http://schemas.openxmlformats.org/drawingml/2006/main" xmlns:r="http://schemas.openxmlformats.org/officeDocument/2006/relationships" xmlns:p="http://schemas.openxmlformats.org/presentationml/2006/main">
   <p:cSld>
     <p:spTree>
@@ -7961,7 +8081,207 @@
 </p:sld>
 </file>
 
-<file path=ppt/slides/slide19.xml><?xml version="1.0" encoding="utf-8"?>
+<file path=ppt/slides/slide2.xml><?xml version="1.0" encoding="utf-8"?>
+<p:sld xmlns:a="http://schemas.openxmlformats.org/drawingml/2006/main" xmlns:r="http://schemas.openxmlformats.org/officeDocument/2006/relationships" xmlns:p="http://schemas.openxmlformats.org/presentationml/2006/main">
+  <p:cSld>
+    <p:spTree>
+      <p:nvGrpSpPr>
+        <p:cNvPr id="1" name=""/>
+        <p:cNvGrpSpPr/>
+        <p:nvPr/>
+      </p:nvGrpSpPr>
+      <p:grpSpPr>
+        <a:xfrm>
+          <a:off x="0" y="0"/>
+          <a:ext cx="0" cy="0"/>
+          <a:chOff x="0" y="0"/>
+          <a:chExt cx="0" cy="0"/>
+        </a:xfrm>
+      </p:grpSpPr>
+      <p:sp>
+        <p:nvSpPr>
+          <p:cNvPr id="2" name="Title 1">
+            <a:extLst>
+              <a:ext uri="{FF2B5EF4-FFF2-40B4-BE49-F238E27FC236}">
+                <a16:creationId xmlns:a16="http://schemas.microsoft.com/office/drawing/2014/main" id="{D0ADAD29-E9FC-44FB-AFAD-55D2F518CEA7}"/>
+              </a:ext>
+            </a:extLst>
+          </p:cNvPr>
+          <p:cNvSpPr>
+            <a:spLocks noGrp="1"/>
+          </p:cNvSpPr>
+          <p:nvPr>
+            <p:ph type="title"/>
+          </p:nvPr>
+        </p:nvSpPr>
+        <p:spPr/>
+        <p:txBody>
+          <a:bodyPr/>
+          <a:lstStyle/>
+          <a:p>
+            <a:r>
+              <a:rPr lang="en-US" dirty="0">
+                <a:effectLst>
+                  <a:outerShdw blurRad="38100" dist="38100" dir="2700000" algn="tl">
+                    <a:srgbClr val="000000">
+                      <a:alpha val="43137"/>
+                    </a:srgbClr>
+                  </a:outerShdw>
+                </a:effectLst>
+              </a:rPr>
+              <a:t>Project Goals:</a:t>
+            </a:r>
+          </a:p>
+        </p:txBody>
+      </p:sp>
+      <p:sp>
+        <p:nvSpPr>
+          <p:cNvPr id="3" name="Content Placeholder 2">
+            <a:extLst>
+              <a:ext uri="{FF2B5EF4-FFF2-40B4-BE49-F238E27FC236}">
+                <a16:creationId xmlns:a16="http://schemas.microsoft.com/office/drawing/2014/main" id="{5BE40E74-7FEF-4EBD-8981-1DB9ECAEC89E}"/>
+              </a:ext>
+            </a:extLst>
+          </p:cNvPr>
+          <p:cNvSpPr>
+            <a:spLocks noGrp="1"/>
+          </p:cNvSpPr>
+          <p:nvPr>
+            <p:ph idx="1"/>
+          </p:nvPr>
+        </p:nvSpPr>
+        <p:spPr>
+          <a:xfrm>
+            <a:off x="677334" y="1792944"/>
+            <a:ext cx="8596668" cy="3880773"/>
+          </a:xfrm>
+        </p:spPr>
+        <p:txBody>
+          <a:bodyPr>
+            <a:normAutofit lnSpcReduction="10000"/>
+          </a:bodyPr>
+          <a:lstStyle/>
+          <a:p>
+            <a:pPr marL="0" indent="0">
+              <a:buNone/>
+            </a:pPr>
+            <a:r>
+              <a:rPr lang="en-US" sz="2400" b="1" dirty="0">
+                <a:effectLst>
+                  <a:outerShdw blurRad="38100" dist="38100" dir="2700000" algn="tl">
+                    <a:srgbClr val="000000">
+                      <a:alpha val="43137"/>
+                    </a:srgbClr>
+                  </a:outerShdw>
+                </a:effectLst>
+              </a:rPr>
+              <a:t>Tool: </a:t>
+            </a:r>
+          </a:p>
+          <a:p>
+            <a:pPr lvl="1"/>
+            <a:r>
+              <a:rPr lang="en-US" dirty="0"/>
+              <a:t>Build a market dashboard with gaming information from across the web</a:t>
+            </a:r>
+          </a:p>
+          <a:p>
+            <a:pPr lvl="1"/>
+            <a:r>
+              <a:rPr lang="en-US" dirty="0"/>
+              <a:t>Cover more than one gaming platform</a:t>
+            </a:r>
+          </a:p>
+          <a:p>
+            <a:pPr marL="457200" lvl="1" indent="0">
+              <a:buNone/>
+            </a:pPr>
+            <a:endParaRPr lang="en-US" dirty="0"/>
+          </a:p>
+          <a:p>
+            <a:pPr marL="0" indent="0">
+              <a:buNone/>
+            </a:pPr>
+            <a:r>
+              <a:rPr lang="en-US" sz="2400" b="1" dirty="0">
+                <a:effectLst>
+                  <a:outerShdw blurRad="38100" dist="38100" dir="2700000" algn="tl">
+                    <a:srgbClr val="000000">
+                      <a:alpha val="43137"/>
+                    </a:srgbClr>
+                  </a:outerShdw>
+                </a:effectLst>
+              </a:rPr>
+              <a:t>Goal: </a:t>
+            </a:r>
+          </a:p>
+          <a:p>
+            <a:pPr lvl="1"/>
+            <a:r>
+              <a:rPr lang="en-US" dirty="0"/>
+              <a:t>Support exploration of feature/genre content value</a:t>
+            </a:r>
+          </a:p>
+          <a:p>
+            <a:pPr lvl="1"/>
+            <a:r>
+              <a:rPr lang="en-US" dirty="0"/>
+              <a:t>Support player profiling for design/marketing awareness</a:t>
+            </a:r>
+          </a:p>
+          <a:p>
+            <a:pPr lvl="1"/>
+            <a:endParaRPr lang="en-US" sz="2000" dirty="0"/>
+          </a:p>
+          <a:p>
+            <a:pPr marL="0" indent="0">
+              <a:buNone/>
+            </a:pPr>
+            <a:r>
+              <a:rPr lang="en-US" sz="2400" b="1" dirty="0">
+                <a:effectLst>
+                  <a:outerShdw blurRad="38100" dist="38100" dir="2700000" algn="tl">
+                    <a:srgbClr val="000000">
+                      <a:alpha val="43137"/>
+                    </a:srgbClr>
+                  </a:outerShdw>
+                </a:effectLst>
+              </a:rPr>
+              <a:t>Target users: </a:t>
+            </a:r>
+          </a:p>
+          <a:p>
+            <a:pPr lvl="1"/>
+            <a:r>
+              <a:rPr lang="en-US" dirty="0"/>
+              <a:t>Product designers, marketing managers, and publishing development</a:t>
+            </a:r>
+          </a:p>
+          <a:p>
+            <a:pPr marL="0" indent="0">
+              <a:buNone/>
+            </a:pPr>
+            <a:endParaRPr lang="en-US" dirty="0"/>
+          </a:p>
+          <a:p>
+            <a:endParaRPr lang="en-US" dirty="0"/>
+          </a:p>
+        </p:txBody>
+      </p:sp>
+    </p:spTree>
+    <p:extLst>
+      <p:ext uri="{BB962C8B-B14F-4D97-AF65-F5344CB8AC3E}">
+        <p14:creationId xmlns:p14="http://schemas.microsoft.com/office/powerpoint/2010/main" val="1099933512"/>
+      </p:ext>
+    </p:extLst>
+  </p:cSld>
+  <p:clrMapOvr>
+    <a:masterClrMapping/>
+  </p:clrMapOvr>
+</p:sld>
+</file>
+
+<file path=ppt/slides/slide20.xml><?xml version="1.0" encoding="utf-8"?>
 <p:sld xmlns:a="http://schemas.openxmlformats.org/drawingml/2006/main" xmlns:r="http://schemas.openxmlformats.org/officeDocument/2006/relationships" xmlns:p="http://schemas.openxmlformats.org/presentationml/2006/main">
   <p:cSld>
     <p:spTree>
@@ -8153,207 +8473,7 @@
 </p:sld>
 </file>
 
-<file path=ppt/slides/slide2.xml><?xml version="1.0" encoding="utf-8"?>
-<p:sld xmlns:a="http://schemas.openxmlformats.org/drawingml/2006/main" xmlns:r="http://schemas.openxmlformats.org/officeDocument/2006/relationships" xmlns:p="http://schemas.openxmlformats.org/presentationml/2006/main">
-  <p:cSld>
-    <p:spTree>
-      <p:nvGrpSpPr>
-        <p:cNvPr id="1" name=""/>
-        <p:cNvGrpSpPr/>
-        <p:nvPr/>
-      </p:nvGrpSpPr>
-      <p:grpSpPr>
-        <a:xfrm>
-          <a:off x="0" y="0"/>
-          <a:ext cx="0" cy="0"/>
-          <a:chOff x="0" y="0"/>
-          <a:chExt cx="0" cy="0"/>
-        </a:xfrm>
-      </p:grpSpPr>
-      <p:sp>
-        <p:nvSpPr>
-          <p:cNvPr id="2" name="Title 1">
-            <a:extLst>
-              <a:ext uri="{FF2B5EF4-FFF2-40B4-BE49-F238E27FC236}">
-                <a16:creationId xmlns:a16="http://schemas.microsoft.com/office/drawing/2014/main" id="{D0ADAD29-E9FC-44FB-AFAD-55D2F518CEA7}"/>
-              </a:ext>
-            </a:extLst>
-          </p:cNvPr>
-          <p:cNvSpPr>
-            <a:spLocks noGrp="1"/>
-          </p:cNvSpPr>
-          <p:nvPr>
-            <p:ph type="title"/>
-          </p:nvPr>
-        </p:nvSpPr>
-        <p:spPr/>
-        <p:txBody>
-          <a:bodyPr/>
-          <a:lstStyle/>
-          <a:p>
-            <a:r>
-              <a:rPr lang="en-US" dirty="0">
-                <a:effectLst>
-                  <a:outerShdw blurRad="38100" dist="38100" dir="2700000" algn="tl">
-                    <a:srgbClr val="000000">
-                      <a:alpha val="43137"/>
-                    </a:srgbClr>
-                  </a:outerShdw>
-                </a:effectLst>
-              </a:rPr>
-              <a:t>Project Goals:</a:t>
-            </a:r>
-          </a:p>
-        </p:txBody>
-      </p:sp>
-      <p:sp>
-        <p:nvSpPr>
-          <p:cNvPr id="3" name="Content Placeholder 2">
-            <a:extLst>
-              <a:ext uri="{FF2B5EF4-FFF2-40B4-BE49-F238E27FC236}">
-                <a16:creationId xmlns:a16="http://schemas.microsoft.com/office/drawing/2014/main" id="{5BE40E74-7FEF-4EBD-8981-1DB9ECAEC89E}"/>
-              </a:ext>
-            </a:extLst>
-          </p:cNvPr>
-          <p:cNvSpPr>
-            <a:spLocks noGrp="1"/>
-          </p:cNvSpPr>
-          <p:nvPr>
-            <p:ph idx="1"/>
-          </p:nvPr>
-        </p:nvSpPr>
-        <p:spPr>
-          <a:xfrm>
-            <a:off x="677334" y="1792944"/>
-            <a:ext cx="8596668" cy="3880773"/>
-          </a:xfrm>
-        </p:spPr>
-        <p:txBody>
-          <a:bodyPr>
-            <a:normAutofit lnSpcReduction="10000"/>
-          </a:bodyPr>
-          <a:lstStyle/>
-          <a:p>
-            <a:pPr marL="0" indent="0">
-              <a:buNone/>
-            </a:pPr>
-            <a:r>
-              <a:rPr lang="en-US" sz="2400" b="1" dirty="0">
-                <a:effectLst>
-                  <a:outerShdw blurRad="38100" dist="38100" dir="2700000" algn="tl">
-                    <a:srgbClr val="000000">
-                      <a:alpha val="43137"/>
-                    </a:srgbClr>
-                  </a:outerShdw>
-                </a:effectLst>
-              </a:rPr>
-              <a:t>Tool: </a:t>
-            </a:r>
-          </a:p>
-          <a:p>
-            <a:pPr lvl="1"/>
-            <a:r>
-              <a:rPr lang="en-US" dirty="0"/>
-              <a:t>Build a market dashboard with gaming information from across the web</a:t>
-            </a:r>
-          </a:p>
-          <a:p>
-            <a:pPr lvl="1"/>
-            <a:r>
-              <a:rPr lang="en-US" dirty="0"/>
-              <a:t>Cover more than one gaming platform</a:t>
-            </a:r>
-          </a:p>
-          <a:p>
-            <a:pPr marL="457200" lvl="1" indent="0">
-              <a:buNone/>
-            </a:pPr>
-            <a:endParaRPr lang="en-US" dirty="0"/>
-          </a:p>
-          <a:p>
-            <a:pPr marL="0" indent="0">
-              <a:buNone/>
-            </a:pPr>
-            <a:r>
-              <a:rPr lang="en-US" sz="2400" b="1" dirty="0">
-                <a:effectLst>
-                  <a:outerShdw blurRad="38100" dist="38100" dir="2700000" algn="tl">
-                    <a:srgbClr val="000000">
-                      <a:alpha val="43137"/>
-                    </a:srgbClr>
-                  </a:outerShdw>
-                </a:effectLst>
-              </a:rPr>
-              <a:t>Goal: </a:t>
-            </a:r>
-          </a:p>
-          <a:p>
-            <a:pPr lvl="1"/>
-            <a:r>
-              <a:rPr lang="en-US" dirty="0"/>
-              <a:t>Support exploration of feature/genre content value</a:t>
-            </a:r>
-          </a:p>
-          <a:p>
-            <a:pPr lvl="1"/>
-            <a:r>
-              <a:rPr lang="en-US" dirty="0"/>
-              <a:t>Support player profiling for design/marketing awareness</a:t>
-            </a:r>
-          </a:p>
-          <a:p>
-            <a:pPr lvl="1"/>
-            <a:endParaRPr lang="en-US" sz="2000" dirty="0"/>
-          </a:p>
-          <a:p>
-            <a:pPr marL="0" indent="0">
-              <a:buNone/>
-            </a:pPr>
-            <a:r>
-              <a:rPr lang="en-US" sz="2400" b="1" dirty="0">
-                <a:effectLst>
-                  <a:outerShdw blurRad="38100" dist="38100" dir="2700000" algn="tl">
-                    <a:srgbClr val="000000">
-                      <a:alpha val="43137"/>
-                    </a:srgbClr>
-                  </a:outerShdw>
-                </a:effectLst>
-              </a:rPr>
-              <a:t>Target users: </a:t>
-            </a:r>
-          </a:p>
-          <a:p>
-            <a:pPr lvl="1"/>
-            <a:r>
-              <a:rPr lang="en-US" dirty="0"/>
-              <a:t>Product designers, marketing managers, and publishing development</a:t>
-            </a:r>
-          </a:p>
-          <a:p>
-            <a:pPr marL="0" indent="0">
-              <a:buNone/>
-            </a:pPr>
-            <a:endParaRPr lang="en-US" dirty="0"/>
-          </a:p>
-          <a:p>
-            <a:endParaRPr lang="en-US" dirty="0"/>
-          </a:p>
-        </p:txBody>
-      </p:sp>
-    </p:spTree>
-    <p:extLst>
-      <p:ext uri="{BB962C8B-B14F-4D97-AF65-F5344CB8AC3E}">
-        <p14:creationId xmlns:p14="http://schemas.microsoft.com/office/powerpoint/2010/main" val="1099933512"/>
-      </p:ext>
-    </p:extLst>
-  </p:cSld>
-  <p:clrMapOvr>
-    <a:masterClrMapping/>
-  </p:clrMapOvr>
-</p:sld>
-</file>
-
-<file path=ppt/slides/slide20.xml><?xml version="1.0" encoding="utf-8"?>
+<file path=ppt/slides/slide21.xml><?xml version="1.0" encoding="utf-8"?>
 <p:sld xmlns:a="http://schemas.openxmlformats.org/drawingml/2006/main" xmlns:r="http://schemas.openxmlformats.org/officeDocument/2006/relationships" xmlns:p="http://schemas.openxmlformats.org/presentationml/2006/main">
   <p:cSld>
     <p:spTree>
@@ -9206,7 +9326,7 @@
                   </a:outerShdw>
                 </a:effectLst>
               </a:rPr>
-              <a:t>Process: Getting Data</a:t>
+              <a:t>Process: Getting Data </a:t>
             </a:r>
           </a:p>
         </p:txBody>

</xml_diff>